<commit_message>
added all the changes
</commit_message>
<xml_diff>
--- a/TASK.pptx
+++ b/TASK.pptx
@@ -10,6 +10,14 @@
     <p:sldId id="258" r:id="rId4"/>
     <p:sldId id="259" r:id="rId5"/>
     <p:sldId id="260" r:id="rId6"/>
+    <p:sldId id="261" r:id="rId7"/>
+    <p:sldId id="262" r:id="rId8"/>
+    <p:sldId id="263" r:id="rId9"/>
+    <p:sldId id="264" r:id="rId10"/>
+    <p:sldId id="265" r:id="rId11"/>
+    <p:sldId id="266" r:id="rId12"/>
+    <p:sldId id="267" r:id="rId13"/>
+    <p:sldId id="268" r:id="rId14"/>
   </p:sldIdLst>
   <p:sldSz cx="12192000" cy="6858000"/>
   <p:notesSz cx="6858000" cy="9144000"/>
@@ -3424,6 +3432,290 @@
 </p:sld>
 </file>
 
+<file path=ppt/slides/slide10.xml><?xml version="1.0" encoding="utf-8"?>
+<p:sld xmlns:a="http://schemas.openxmlformats.org/drawingml/2006/main" xmlns:r="http://schemas.openxmlformats.org/officeDocument/2006/relationships" xmlns:p="http://schemas.openxmlformats.org/presentationml/2006/main">
+  <p:cSld>
+    <p:spTree>
+      <p:nvGrpSpPr>
+        <p:cNvPr id="1" name="">
+          <a:extLst>
+            <a:ext uri="{FF2B5EF4-FFF2-40B4-BE49-F238E27FC236}">
+              <a16:creationId xmlns:a16="http://schemas.microsoft.com/office/drawing/2014/main" id="{DFF4DBFF-00A0-98A0-CECA-0A8534F4EA3E}"/>
+            </a:ext>
+          </a:extLst>
+        </p:cNvPr>
+        <p:cNvGrpSpPr/>
+        <p:nvPr/>
+      </p:nvGrpSpPr>
+      <p:grpSpPr>
+        <a:xfrm>
+          <a:off x="0" y="0"/>
+          <a:ext cx="0" cy="0"/>
+          <a:chOff x="0" y="0"/>
+          <a:chExt cx="0" cy="0"/>
+        </a:xfrm>
+      </p:grpSpPr>
+      <p:sp>
+        <p:nvSpPr>
+          <p:cNvPr id="2" name="Title 1">
+            <a:extLst>
+              <a:ext uri="{FF2B5EF4-FFF2-40B4-BE49-F238E27FC236}">
+                <a16:creationId xmlns:a16="http://schemas.microsoft.com/office/drawing/2014/main" id="{7230D3A6-BEB6-F186-1079-0A4162FBE070}"/>
+              </a:ext>
+            </a:extLst>
+          </p:cNvPr>
+          <p:cNvSpPr>
+            <a:spLocks noGrp="1"/>
+          </p:cNvSpPr>
+          <p:nvPr>
+            <p:ph type="ctrTitle"/>
+          </p:nvPr>
+        </p:nvSpPr>
+        <p:spPr>
+          <a:xfrm>
+            <a:off x="1487863" y="740789"/>
+            <a:ext cx="8895761" cy="584886"/>
+          </a:xfrm>
+        </p:spPr>
+        <p:txBody>
+          <a:bodyPr>
+            <a:normAutofit/>
+          </a:bodyPr>
+          <a:lstStyle/>
+          <a:p>
+            <a:r>
+              <a:rPr lang="en-IN" sz="2800" dirty="0"/>
+              <a:t>REPO AFTER PUSHING</a:t>
+            </a:r>
+          </a:p>
+        </p:txBody>
+      </p:sp>
+    </p:spTree>
+    <p:extLst>
+      <p:ext uri="{BB962C8B-B14F-4D97-AF65-F5344CB8AC3E}">
+        <p14:creationId xmlns:p14="http://schemas.microsoft.com/office/powerpoint/2010/main" val="1182379110"/>
+      </p:ext>
+    </p:extLst>
+  </p:cSld>
+  <p:clrMapOvr>
+    <a:masterClrMapping/>
+  </p:clrMapOvr>
+</p:sld>
+</file>
+
+<file path=ppt/slides/slide11.xml><?xml version="1.0" encoding="utf-8"?>
+<p:sld xmlns:a="http://schemas.openxmlformats.org/drawingml/2006/main" xmlns:r="http://schemas.openxmlformats.org/officeDocument/2006/relationships" xmlns:p="http://schemas.openxmlformats.org/presentationml/2006/main">
+  <p:cSld>
+    <p:spTree>
+      <p:nvGrpSpPr>
+        <p:cNvPr id="1" name="">
+          <a:extLst>
+            <a:ext uri="{FF2B5EF4-FFF2-40B4-BE49-F238E27FC236}">
+              <a16:creationId xmlns:a16="http://schemas.microsoft.com/office/drawing/2014/main" id="{C6CB8B25-2206-72B8-1021-FC0A2122B422}"/>
+            </a:ext>
+          </a:extLst>
+        </p:cNvPr>
+        <p:cNvGrpSpPr/>
+        <p:nvPr/>
+      </p:nvGrpSpPr>
+      <p:grpSpPr>
+        <a:xfrm>
+          <a:off x="0" y="0"/>
+          <a:ext cx="0" cy="0"/>
+          <a:chOff x="0" y="0"/>
+          <a:chExt cx="0" cy="0"/>
+        </a:xfrm>
+      </p:grpSpPr>
+      <p:sp>
+        <p:nvSpPr>
+          <p:cNvPr id="2" name="Title 1">
+            <a:extLst>
+              <a:ext uri="{FF2B5EF4-FFF2-40B4-BE49-F238E27FC236}">
+                <a16:creationId xmlns:a16="http://schemas.microsoft.com/office/drawing/2014/main" id="{7FF877C6-EC75-A716-FFD4-713551F1388C}"/>
+              </a:ext>
+            </a:extLst>
+          </p:cNvPr>
+          <p:cNvSpPr>
+            <a:spLocks noGrp="1"/>
+          </p:cNvSpPr>
+          <p:nvPr>
+            <p:ph type="ctrTitle"/>
+          </p:nvPr>
+        </p:nvSpPr>
+        <p:spPr>
+          <a:xfrm>
+            <a:off x="1487863" y="740789"/>
+            <a:ext cx="8895761" cy="584886"/>
+          </a:xfrm>
+        </p:spPr>
+        <p:txBody>
+          <a:bodyPr>
+            <a:normAutofit/>
+          </a:bodyPr>
+          <a:lstStyle/>
+          <a:p>
+            <a:r>
+              <a:rPr lang="en-IN" sz="2800" dirty="0"/>
+              <a:t>REPO AFTER PUSHING</a:t>
+            </a:r>
+          </a:p>
+        </p:txBody>
+      </p:sp>
+    </p:spTree>
+    <p:extLst>
+      <p:ext uri="{BB962C8B-B14F-4D97-AF65-F5344CB8AC3E}">
+        <p14:creationId xmlns:p14="http://schemas.microsoft.com/office/powerpoint/2010/main" val="3384635560"/>
+      </p:ext>
+    </p:extLst>
+  </p:cSld>
+  <p:clrMapOvr>
+    <a:masterClrMapping/>
+  </p:clrMapOvr>
+</p:sld>
+</file>
+
+<file path=ppt/slides/slide12.xml><?xml version="1.0" encoding="utf-8"?>
+<p:sld xmlns:a="http://schemas.openxmlformats.org/drawingml/2006/main" xmlns:r="http://schemas.openxmlformats.org/officeDocument/2006/relationships" xmlns:p="http://schemas.openxmlformats.org/presentationml/2006/main">
+  <p:cSld>
+    <p:spTree>
+      <p:nvGrpSpPr>
+        <p:cNvPr id="1" name="">
+          <a:extLst>
+            <a:ext uri="{FF2B5EF4-FFF2-40B4-BE49-F238E27FC236}">
+              <a16:creationId xmlns:a16="http://schemas.microsoft.com/office/drawing/2014/main" id="{01172BF4-4182-89A9-21A4-E5D0A84574E4}"/>
+            </a:ext>
+          </a:extLst>
+        </p:cNvPr>
+        <p:cNvGrpSpPr/>
+        <p:nvPr/>
+      </p:nvGrpSpPr>
+      <p:grpSpPr>
+        <a:xfrm>
+          <a:off x="0" y="0"/>
+          <a:ext cx="0" cy="0"/>
+          <a:chOff x="0" y="0"/>
+          <a:chExt cx="0" cy="0"/>
+        </a:xfrm>
+      </p:grpSpPr>
+      <p:sp>
+        <p:nvSpPr>
+          <p:cNvPr id="2" name="Title 1">
+            <a:extLst>
+              <a:ext uri="{FF2B5EF4-FFF2-40B4-BE49-F238E27FC236}">
+                <a16:creationId xmlns:a16="http://schemas.microsoft.com/office/drawing/2014/main" id="{13D2BD7D-4156-4E4E-59AF-A834BECCFCF7}"/>
+              </a:ext>
+            </a:extLst>
+          </p:cNvPr>
+          <p:cNvSpPr>
+            <a:spLocks noGrp="1"/>
+          </p:cNvSpPr>
+          <p:nvPr>
+            <p:ph type="ctrTitle"/>
+          </p:nvPr>
+        </p:nvSpPr>
+        <p:spPr>
+          <a:xfrm>
+            <a:off x="1487863" y="740789"/>
+            <a:ext cx="8895761" cy="584886"/>
+          </a:xfrm>
+        </p:spPr>
+        <p:txBody>
+          <a:bodyPr>
+            <a:normAutofit/>
+          </a:bodyPr>
+          <a:lstStyle/>
+          <a:p>
+            <a:r>
+              <a:rPr lang="en-IN" sz="2800" dirty="0"/>
+              <a:t>REPO AFTER PUSHING</a:t>
+            </a:r>
+          </a:p>
+        </p:txBody>
+      </p:sp>
+    </p:spTree>
+    <p:extLst>
+      <p:ext uri="{BB962C8B-B14F-4D97-AF65-F5344CB8AC3E}">
+        <p14:creationId xmlns:p14="http://schemas.microsoft.com/office/powerpoint/2010/main" val="1360215820"/>
+      </p:ext>
+    </p:extLst>
+  </p:cSld>
+  <p:clrMapOvr>
+    <a:masterClrMapping/>
+  </p:clrMapOvr>
+</p:sld>
+</file>
+
+<file path=ppt/slides/slide13.xml><?xml version="1.0" encoding="utf-8"?>
+<p:sld xmlns:a="http://schemas.openxmlformats.org/drawingml/2006/main" xmlns:r="http://schemas.openxmlformats.org/officeDocument/2006/relationships" xmlns:p="http://schemas.openxmlformats.org/presentationml/2006/main">
+  <p:cSld>
+    <p:spTree>
+      <p:nvGrpSpPr>
+        <p:cNvPr id="1" name="">
+          <a:extLst>
+            <a:ext uri="{FF2B5EF4-FFF2-40B4-BE49-F238E27FC236}">
+              <a16:creationId xmlns:a16="http://schemas.microsoft.com/office/drawing/2014/main" id="{D0394432-3AF0-CC9C-08D8-540C6924699E}"/>
+            </a:ext>
+          </a:extLst>
+        </p:cNvPr>
+        <p:cNvGrpSpPr/>
+        <p:nvPr/>
+      </p:nvGrpSpPr>
+      <p:grpSpPr>
+        <a:xfrm>
+          <a:off x="0" y="0"/>
+          <a:ext cx="0" cy="0"/>
+          <a:chOff x="0" y="0"/>
+          <a:chExt cx="0" cy="0"/>
+        </a:xfrm>
+      </p:grpSpPr>
+      <p:sp>
+        <p:nvSpPr>
+          <p:cNvPr id="2" name="Title 1">
+            <a:extLst>
+              <a:ext uri="{FF2B5EF4-FFF2-40B4-BE49-F238E27FC236}">
+                <a16:creationId xmlns:a16="http://schemas.microsoft.com/office/drawing/2014/main" id="{75807660-07A0-0EF0-344C-77E17E285455}"/>
+              </a:ext>
+            </a:extLst>
+          </p:cNvPr>
+          <p:cNvSpPr>
+            <a:spLocks noGrp="1"/>
+          </p:cNvSpPr>
+          <p:nvPr>
+            <p:ph type="ctrTitle"/>
+          </p:nvPr>
+        </p:nvSpPr>
+        <p:spPr>
+          <a:xfrm>
+            <a:off x="1487863" y="740789"/>
+            <a:ext cx="8895761" cy="584886"/>
+          </a:xfrm>
+        </p:spPr>
+        <p:txBody>
+          <a:bodyPr>
+            <a:normAutofit/>
+          </a:bodyPr>
+          <a:lstStyle/>
+          <a:p>
+            <a:r>
+              <a:rPr lang="en-IN" sz="2800" dirty="0"/>
+              <a:t>REPO AFTER PUSHING</a:t>
+            </a:r>
+          </a:p>
+        </p:txBody>
+      </p:sp>
+    </p:spTree>
+    <p:extLst>
+      <p:ext uri="{BB962C8B-B14F-4D97-AF65-F5344CB8AC3E}">
+        <p14:creationId xmlns:p14="http://schemas.microsoft.com/office/powerpoint/2010/main" val="99037685"/>
+      </p:ext>
+    </p:extLst>
+  </p:cSld>
+  <p:clrMapOvr>
+    <a:masterClrMapping/>
+  </p:clrMapOvr>
+</p:sld>
+</file>
+
 <file path=ppt/slides/slide2.xml><?xml version="1.0" encoding="utf-8"?>
 <p:sld xmlns:a="http://schemas.openxmlformats.org/drawingml/2006/main" xmlns:r="http://schemas.openxmlformats.org/officeDocument/2006/relationships" xmlns:p="http://schemas.openxmlformats.org/presentationml/2006/main">
   <p:cSld>
@@ -3578,13 +3870,8 @@
           <a:p>
             <a:r>
               <a:rPr lang="en-IN" sz="2800" dirty="0"/>
-              <a:t>Add </a:t>
-            </a:r>
-            <a:r>
-              <a:rPr lang="en-IN" sz="2800"/>
-              <a:t>/ commit</a:t>
-            </a:r>
-            <a:endParaRPr lang="en-IN" sz="2800" dirty="0"/>
+              <a:t>Add / commit</a:t>
+            </a:r>
           </a:p>
         </p:txBody>
       </p:sp>
@@ -3610,8 +3897,38 @@
         </p:blipFill>
         <p:spPr>
           <a:xfrm>
-            <a:off x="1953737" y="2039237"/>
-            <a:ext cx="7964011" cy="3477110"/>
+            <a:off x="662266" y="1417068"/>
+            <a:ext cx="7152556" cy="3122826"/>
+          </a:xfrm>
+          <a:prstGeom prst="rect">
+            <a:avLst/>
+          </a:prstGeom>
+        </p:spPr>
+      </p:pic>
+      <p:pic>
+        <p:nvPicPr>
+          <p:cNvPr id="7" name="Picture 6">
+            <a:extLst>
+              <a:ext uri="{FF2B5EF4-FFF2-40B4-BE49-F238E27FC236}">
+                <a16:creationId xmlns:a16="http://schemas.microsoft.com/office/drawing/2014/main" id="{9DE9C9D8-E5D3-2351-EEB3-64B273C448DA}"/>
+              </a:ext>
+            </a:extLst>
+          </p:cNvPr>
+          <p:cNvPicPr>
+            <a:picLocks noChangeAspect="1"/>
+          </p:cNvPicPr>
+          <p:nvPr/>
+        </p:nvPicPr>
+        <p:blipFill>
+          <a:blip r:embed="rId3"/>
+          <a:stretch>
+            <a:fillRect/>
+          </a:stretch>
+        </p:blipFill>
+        <p:spPr>
+          <a:xfrm>
+            <a:off x="2782948" y="4631287"/>
+            <a:ext cx="7723224" cy="2088843"/>
           </a:xfrm>
           <a:prstGeom prst="rect">
             <a:avLst/>
@@ -3684,11 +4001,41 @@
           <a:p>
             <a:r>
               <a:rPr lang="en-IN" sz="2800" dirty="0"/>
-              <a:t>CREATED A REPO</a:t>
-            </a:r>
-          </a:p>
-        </p:txBody>
-      </p:sp>
+              <a:t>CREATED MAIN BRACH AND PUSHED</a:t>
+            </a:r>
+          </a:p>
+        </p:txBody>
+      </p:sp>
+      <p:pic>
+        <p:nvPicPr>
+          <p:cNvPr id="4" name="Picture 3">
+            <a:extLst>
+              <a:ext uri="{FF2B5EF4-FFF2-40B4-BE49-F238E27FC236}">
+                <a16:creationId xmlns:a16="http://schemas.microsoft.com/office/drawing/2014/main" id="{DBA9277D-6026-EE2E-D38F-29E63EBB99DB}"/>
+              </a:ext>
+            </a:extLst>
+          </p:cNvPr>
+          <p:cNvPicPr>
+            <a:picLocks noChangeAspect="1"/>
+          </p:cNvPicPr>
+          <p:nvPr/>
+        </p:nvPicPr>
+        <p:blipFill>
+          <a:blip r:embed="rId2"/>
+          <a:stretch>
+            <a:fillRect/>
+          </a:stretch>
+        </p:blipFill>
+        <p:spPr>
+          <a:xfrm>
+            <a:off x="1746420" y="1820842"/>
+            <a:ext cx="8528456" cy="3513770"/>
+          </a:xfrm>
+          <a:prstGeom prst="rect">
+            <a:avLst/>
+          </a:prstGeom>
+        </p:spPr>
+      </p:pic>
     </p:spTree>
     <p:extLst>
       <p:ext uri="{BB962C8B-B14F-4D97-AF65-F5344CB8AC3E}">
@@ -3755,15 +4102,359 @@
           <a:p>
             <a:r>
               <a:rPr lang="en-IN" sz="2800" dirty="0"/>
-              <a:t>CREATED A REPO</a:t>
-            </a:r>
-          </a:p>
-        </p:txBody>
-      </p:sp>
+              <a:t>REPO AFTER PUSHING</a:t>
+            </a:r>
+          </a:p>
+        </p:txBody>
+      </p:sp>
+      <p:pic>
+        <p:nvPicPr>
+          <p:cNvPr id="4" name="Picture 3">
+            <a:extLst>
+              <a:ext uri="{FF2B5EF4-FFF2-40B4-BE49-F238E27FC236}">
+                <a16:creationId xmlns:a16="http://schemas.microsoft.com/office/drawing/2014/main" id="{6DC6D475-D5DD-DE1F-BF62-4A4D99E9F14C}"/>
+              </a:ext>
+            </a:extLst>
+          </p:cNvPr>
+          <p:cNvPicPr>
+            <a:picLocks noChangeAspect="1"/>
+          </p:cNvPicPr>
+          <p:nvPr/>
+        </p:nvPicPr>
+        <p:blipFill>
+          <a:blip r:embed="rId2"/>
+          <a:stretch>
+            <a:fillRect/>
+          </a:stretch>
+        </p:blipFill>
+        <p:spPr>
+          <a:xfrm>
+            <a:off x="1344575" y="1762178"/>
+            <a:ext cx="9182335" cy="4157855"/>
+          </a:xfrm>
+          <a:prstGeom prst="rect">
+            <a:avLst/>
+          </a:prstGeom>
+        </p:spPr>
+      </p:pic>
     </p:spTree>
     <p:extLst>
       <p:ext uri="{BB962C8B-B14F-4D97-AF65-F5344CB8AC3E}">
         <p14:creationId xmlns:p14="http://schemas.microsoft.com/office/powerpoint/2010/main" val="558902297"/>
+      </p:ext>
+    </p:extLst>
+  </p:cSld>
+  <p:clrMapOvr>
+    <a:masterClrMapping/>
+  </p:clrMapOvr>
+</p:sld>
+</file>
+
+<file path=ppt/slides/slide6.xml><?xml version="1.0" encoding="utf-8"?>
+<p:sld xmlns:a="http://schemas.openxmlformats.org/drawingml/2006/main" xmlns:r="http://schemas.openxmlformats.org/officeDocument/2006/relationships" xmlns:p="http://schemas.openxmlformats.org/presentationml/2006/main">
+  <p:cSld>
+    <p:spTree>
+      <p:nvGrpSpPr>
+        <p:cNvPr id="1" name="">
+          <a:extLst>
+            <a:ext uri="{FF2B5EF4-FFF2-40B4-BE49-F238E27FC236}">
+              <a16:creationId xmlns:a16="http://schemas.microsoft.com/office/drawing/2014/main" id="{9EFDD4E7-DE03-A9F7-151B-0109C122A882}"/>
+            </a:ext>
+          </a:extLst>
+        </p:cNvPr>
+        <p:cNvGrpSpPr/>
+        <p:nvPr/>
+      </p:nvGrpSpPr>
+      <p:grpSpPr>
+        <a:xfrm>
+          <a:off x="0" y="0"/>
+          <a:ext cx="0" cy="0"/>
+          <a:chOff x="0" y="0"/>
+          <a:chExt cx="0" cy="0"/>
+        </a:xfrm>
+      </p:grpSpPr>
+      <p:sp>
+        <p:nvSpPr>
+          <p:cNvPr id="2" name="Title 1">
+            <a:extLst>
+              <a:ext uri="{FF2B5EF4-FFF2-40B4-BE49-F238E27FC236}">
+                <a16:creationId xmlns:a16="http://schemas.microsoft.com/office/drawing/2014/main" id="{73B72F24-0EBD-2E60-F860-D0DE7A31EA85}"/>
+              </a:ext>
+            </a:extLst>
+          </p:cNvPr>
+          <p:cNvSpPr>
+            <a:spLocks noGrp="1"/>
+          </p:cNvSpPr>
+          <p:nvPr>
+            <p:ph type="ctrTitle"/>
+          </p:nvPr>
+        </p:nvSpPr>
+        <p:spPr>
+          <a:xfrm>
+            <a:off x="1487863" y="740789"/>
+            <a:ext cx="8895761" cy="584886"/>
+          </a:xfrm>
+        </p:spPr>
+        <p:txBody>
+          <a:bodyPr>
+            <a:normAutofit/>
+          </a:bodyPr>
+          <a:lstStyle/>
+          <a:p>
+            <a:r>
+              <a:rPr lang="en-IN" sz="2800" dirty="0"/>
+              <a:t>CREATED README FILE</a:t>
+            </a:r>
+          </a:p>
+        </p:txBody>
+      </p:sp>
+      <p:pic>
+        <p:nvPicPr>
+          <p:cNvPr id="5" name="Picture 4">
+            <a:extLst>
+              <a:ext uri="{FF2B5EF4-FFF2-40B4-BE49-F238E27FC236}">
+                <a16:creationId xmlns:a16="http://schemas.microsoft.com/office/drawing/2014/main" id="{4344EDC9-F8C0-81FF-3234-39212B8DBCF0}"/>
+              </a:ext>
+            </a:extLst>
+          </p:cNvPr>
+          <p:cNvPicPr>
+            <a:picLocks noChangeAspect="1"/>
+          </p:cNvPicPr>
+          <p:nvPr/>
+        </p:nvPicPr>
+        <p:blipFill>
+          <a:blip r:embed="rId2"/>
+          <a:stretch>
+            <a:fillRect/>
+          </a:stretch>
+        </p:blipFill>
+        <p:spPr>
+          <a:xfrm>
+            <a:off x="1875934" y="1923067"/>
+            <a:ext cx="9000165" cy="4344092"/>
+          </a:xfrm>
+          <a:prstGeom prst="rect">
+            <a:avLst/>
+          </a:prstGeom>
+        </p:spPr>
+      </p:pic>
+    </p:spTree>
+    <p:extLst>
+      <p:ext uri="{BB962C8B-B14F-4D97-AF65-F5344CB8AC3E}">
+        <p14:creationId xmlns:p14="http://schemas.microsoft.com/office/powerpoint/2010/main" val="683183331"/>
+      </p:ext>
+    </p:extLst>
+  </p:cSld>
+  <p:clrMapOvr>
+    <a:masterClrMapping/>
+  </p:clrMapOvr>
+</p:sld>
+</file>
+
+<file path=ppt/slides/slide7.xml><?xml version="1.0" encoding="utf-8"?>
+<p:sld xmlns:a="http://schemas.openxmlformats.org/drawingml/2006/main" xmlns:r="http://schemas.openxmlformats.org/officeDocument/2006/relationships" xmlns:p="http://schemas.openxmlformats.org/presentationml/2006/main">
+  <p:cSld>
+    <p:spTree>
+      <p:nvGrpSpPr>
+        <p:cNvPr id="1" name="">
+          <a:extLst>
+            <a:ext uri="{FF2B5EF4-FFF2-40B4-BE49-F238E27FC236}">
+              <a16:creationId xmlns:a16="http://schemas.microsoft.com/office/drawing/2014/main" id="{E10CF3B0-1C68-0D9A-BCD4-1E9B50B3DAB4}"/>
+            </a:ext>
+          </a:extLst>
+        </p:cNvPr>
+        <p:cNvGrpSpPr/>
+        <p:nvPr/>
+      </p:nvGrpSpPr>
+      <p:grpSpPr>
+        <a:xfrm>
+          <a:off x="0" y="0"/>
+          <a:ext cx="0" cy="0"/>
+          <a:chOff x="0" y="0"/>
+          <a:chExt cx="0" cy="0"/>
+        </a:xfrm>
+      </p:grpSpPr>
+      <p:sp>
+        <p:nvSpPr>
+          <p:cNvPr id="2" name="Title 1">
+            <a:extLst>
+              <a:ext uri="{FF2B5EF4-FFF2-40B4-BE49-F238E27FC236}">
+                <a16:creationId xmlns:a16="http://schemas.microsoft.com/office/drawing/2014/main" id="{08528A46-B59B-1408-EF87-AFF3E8953367}"/>
+              </a:ext>
+            </a:extLst>
+          </p:cNvPr>
+          <p:cNvSpPr>
+            <a:spLocks noGrp="1"/>
+          </p:cNvSpPr>
+          <p:nvPr>
+            <p:ph type="ctrTitle"/>
+          </p:nvPr>
+        </p:nvSpPr>
+        <p:spPr>
+          <a:xfrm>
+            <a:off x="1487863" y="740789"/>
+            <a:ext cx="8895761" cy="584886"/>
+          </a:xfrm>
+        </p:spPr>
+        <p:txBody>
+          <a:bodyPr>
+            <a:normAutofit/>
+          </a:bodyPr>
+          <a:lstStyle/>
+          <a:p>
+            <a:r>
+              <a:rPr lang="en-IN" sz="2800" dirty="0"/>
+              <a:t>REPO AFTER PUSHING</a:t>
+            </a:r>
+          </a:p>
+        </p:txBody>
+      </p:sp>
+    </p:spTree>
+    <p:extLst>
+      <p:ext uri="{BB962C8B-B14F-4D97-AF65-F5344CB8AC3E}">
+        <p14:creationId xmlns:p14="http://schemas.microsoft.com/office/powerpoint/2010/main" val="2579998910"/>
+      </p:ext>
+    </p:extLst>
+  </p:cSld>
+  <p:clrMapOvr>
+    <a:masterClrMapping/>
+  </p:clrMapOvr>
+</p:sld>
+</file>
+
+<file path=ppt/slides/slide8.xml><?xml version="1.0" encoding="utf-8"?>
+<p:sld xmlns:a="http://schemas.openxmlformats.org/drawingml/2006/main" xmlns:r="http://schemas.openxmlformats.org/officeDocument/2006/relationships" xmlns:p="http://schemas.openxmlformats.org/presentationml/2006/main">
+  <p:cSld>
+    <p:spTree>
+      <p:nvGrpSpPr>
+        <p:cNvPr id="1" name="">
+          <a:extLst>
+            <a:ext uri="{FF2B5EF4-FFF2-40B4-BE49-F238E27FC236}">
+              <a16:creationId xmlns:a16="http://schemas.microsoft.com/office/drawing/2014/main" id="{CEF0A7FE-C9AC-D271-DCDC-D41E8C9E0274}"/>
+            </a:ext>
+          </a:extLst>
+        </p:cNvPr>
+        <p:cNvGrpSpPr/>
+        <p:nvPr/>
+      </p:nvGrpSpPr>
+      <p:grpSpPr>
+        <a:xfrm>
+          <a:off x="0" y="0"/>
+          <a:ext cx="0" cy="0"/>
+          <a:chOff x="0" y="0"/>
+          <a:chExt cx="0" cy="0"/>
+        </a:xfrm>
+      </p:grpSpPr>
+      <p:sp>
+        <p:nvSpPr>
+          <p:cNvPr id="2" name="Title 1">
+            <a:extLst>
+              <a:ext uri="{FF2B5EF4-FFF2-40B4-BE49-F238E27FC236}">
+                <a16:creationId xmlns:a16="http://schemas.microsoft.com/office/drawing/2014/main" id="{7117C2FA-AB62-1690-5B7C-D68125DD0656}"/>
+              </a:ext>
+            </a:extLst>
+          </p:cNvPr>
+          <p:cNvSpPr>
+            <a:spLocks noGrp="1"/>
+          </p:cNvSpPr>
+          <p:nvPr>
+            <p:ph type="ctrTitle"/>
+          </p:nvPr>
+        </p:nvSpPr>
+        <p:spPr>
+          <a:xfrm>
+            <a:off x="1487863" y="740789"/>
+            <a:ext cx="8895761" cy="584886"/>
+          </a:xfrm>
+        </p:spPr>
+        <p:txBody>
+          <a:bodyPr>
+            <a:normAutofit/>
+          </a:bodyPr>
+          <a:lstStyle/>
+          <a:p>
+            <a:r>
+              <a:rPr lang="en-IN" sz="2800" dirty="0"/>
+              <a:t>REPO AFTER PUSHING</a:t>
+            </a:r>
+          </a:p>
+        </p:txBody>
+      </p:sp>
+    </p:spTree>
+    <p:extLst>
+      <p:ext uri="{BB962C8B-B14F-4D97-AF65-F5344CB8AC3E}">
+        <p14:creationId xmlns:p14="http://schemas.microsoft.com/office/powerpoint/2010/main" val="1781857438"/>
+      </p:ext>
+    </p:extLst>
+  </p:cSld>
+  <p:clrMapOvr>
+    <a:masterClrMapping/>
+  </p:clrMapOvr>
+</p:sld>
+</file>
+
+<file path=ppt/slides/slide9.xml><?xml version="1.0" encoding="utf-8"?>
+<p:sld xmlns:a="http://schemas.openxmlformats.org/drawingml/2006/main" xmlns:r="http://schemas.openxmlformats.org/officeDocument/2006/relationships" xmlns:p="http://schemas.openxmlformats.org/presentationml/2006/main">
+  <p:cSld>
+    <p:spTree>
+      <p:nvGrpSpPr>
+        <p:cNvPr id="1" name="">
+          <a:extLst>
+            <a:ext uri="{FF2B5EF4-FFF2-40B4-BE49-F238E27FC236}">
+              <a16:creationId xmlns:a16="http://schemas.microsoft.com/office/drawing/2014/main" id="{6DAB2BEC-680C-C849-5D86-B74434F2AAB7}"/>
+            </a:ext>
+          </a:extLst>
+        </p:cNvPr>
+        <p:cNvGrpSpPr/>
+        <p:nvPr/>
+      </p:nvGrpSpPr>
+      <p:grpSpPr>
+        <a:xfrm>
+          <a:off x="0" y="0"/>
+          <a:ext cx="0" cy="0"/>
+          <a:chOff x="0" y="0"/>
+          <a:chExt cx="0" cy="0"/>
+        </a:xfrm>
+      </p:grpSpPr>
+      <p:sp>
+        <p:nvSpPr>
+          <p:cNvPr id="2" name="Title 1">
+            <a:extLst>
+              <a:ext uri="{FF2B5EF4-FFF2-40B4-BE49-F238E27FC236}">
+                <a16:creationId xmlns:a16="http://schemas.microsoft.com/office/drawing/2014/main" id="{86A963EA-CACB-75EF-0EC3-F35301EBB3F5}"/>
+              </a:ext>
+            </a:extLst>
+          </p:cNvPr>
+          <p:cNvSpPr>
+            <a:spLocks noGrp="1"/>
+          </p:cNvSpPr>
+          <p:nvPr>
+            <p:ph type="ctrTitle"/>
+          </p:nvPr>
+        </p:nvSpPr>
+        <p:spPr>
+          <a:xfrm>
+            <a:off x="1487863" y="740789"/>
+            <a:ext cx="8895761" cy="584886"/>
+          </a:xfrm>
+        </p:spPr>
+        <p:txBody>
+          <a:bodyPr>
+            <a:normAutofit/>
+          </a:bodyPr>
+          <a:lstStyle/>
+          <a:p>
+            <a:r>
+              <a:rPr lang="en-IN" sz="2800" dirty="0"/>
+              <a:t>REPO AFTER PUSHING</a:t>
+            </a:r>
+          </a:p>
+        </p:txBody>
+      </p:sp>
+    </p:spTree>
+    <p:extLst>
+      <p:ext uri="{BB962C8B-B14F-4D97-AF65-F5344CB8AC3E}">
+        <p14:creationId xmlns:p14="http://schemas.microsoft.com/office/powerpoint/2010/main" val="201967494"/>
       </p:ext>
     </p:extLst>
   </p:cSld>

</xml_diff>

<commit_message>
save progress before pulling
</commit_message>
<xml_diff>
--- a/TASK.pptx
+++ b/TASK.pptx
@@ -3485,11 +3485,41 @@
           <a:p>
             <a:r>
               <a:rPr lang="en-IN" sz="2800" dirty="0"/>
-              <a:t>REPO AFTER PUSHING</a:t>
-            </a:r>
-          </a:p>
-        </p:txBody>
-      </p:sp>
+              <a:t>REPO merging</a:t>
+            </a:r>
+          </a:p>
+        </p:txBody>
+      </p:sp>
+      <p:pic>
+        <p:nvPicPr>
+          <p:cNvPr id="5" name="Picture 4">
+            <a:extLst>
+              <a:ext uri="{FF2B5EF4-FFF2-40B4-BE49-F238E27FC236}">
+                <a16:creationId xmlns:a16="http://schemas.microsoft.com/office/drawing/2014/main" id="{2A46C9FC-592F-D862-C98A-69B775E04DDB}"/>
+              </a:ext>
+            </a:extLst>
+          </p:cNvPr>
+          <p:cNvPicPr>
+            <a:picLocks noChangeAspect="1"/>
+          </p:cNvPicPr>
+          <p:nvPr/>
+        </p:nvPicPr>
+        <p:blipFill>
+          <a:blip r:embed="rId2"/>
+          <a:stretch>
+            <a:fillRect/>
+          </a:stretch>
+        </p:blipFill>
+        <p:spPr>
+          <a:xfrm>
+            <a:off x="327348" y="2012641"/>
+            <a:ext cx="11751529" cy="4275037"/>
+          </a:xfrm>
+          <a:prstGeom prst="rect">
+            <a:avLst/>
+          </a:prstGeom>
+        </p:spPr>
+      </p:pic>
     </p:spTree>
     <p:extLst>
       <p:ext uri="{BB962C8B-B14F-4D97-AF65-F5344CB8AC3E}">
@@ -3556,11 +3586,46 @@
           <a:p>
             <a:r>
               <a:rPr lang="en-IN" sz="2800" dirty="0"/>
-              <a:t>REPO AFTER PUSHING</a:t>
-            </a:r>
-          </a:p>
-        </p:txBody>
-      </p:sp>
+              <a:t>.</a:t>
+            </a:r>
+            <a:r>
+              <a:rPr lang="en-IN" sz="2800" dirty="0" err="1"/>
+              <a:t>gitignore</a:t>
+            </a:r>
+            <a:endParaRPr lang="en-IN" sz="2800" dirty="0"/>
+          </a:p>
+        </p:txBody>
+      </p:sp>
+      <p:pic>
+        <p:nvPicPr>
+          <p:cNvPr id="5" name="Picture 4">
+            <a:extLst>
+              <a:ext uri="{FF2B5EF4-FFF2-40B4-BE49-F238E27FC236}">
+                <a16:creationId xmlns:a16="http://schemas.microsoft.com/office/drawing/2014/main" id="{03ABE9D7-278D-8B1A-8EBC-A988B8319D97}"/>
+              </a:ext>
+            </a:extLst>
+          </p:cNvPr>
+          <p:cNvPicPr>
+            <a:picLocks noChangeAspect="1"/>
+          </p:cNvPicPr>
+          <p:nvPr/>
+        </p:nvPicPr>
+        <p:blipFill>
+          <a:blip r:embed="rId2"/>
+          <a:stretch>
+            <a:fillRect/>
+          </a:stretch>
+        </p:blipFill>
+        <p:spPr>
+          <a:xfrm>
+            <a:off x="2785600" y="1709497"/>
+            <a:ext cx="6620799" cy="3439005"/>
+          </a:xfrm>
+          <a:prstGeom prst="rect">
+            <a:avLst/>
+          </a:prstGeom>
+        </p:spPr>
+      </p:pic>
     </p:spTree>
     <p:extLst>
       <p:ext uri="{BB962C8B-B14F-4D97-AF65-F5344CB8AC3E}">
@@ -4304,11 +4369,71 @@
           <a:p>
             <a:r>
               <a:rPr lang="en-IN" sz="2800" dirty="0"/>
-              <a:t>REPO AFTER PUSHING</a:t>
-            </a:r>
-          </a:p>
-        </p:txBody>
-      </p:sp>
+              <a:t>Creating another branch</a:t>
+            </a:r>
+          </a:p>
+        </p:txBody>
+      </p:sp>
+      <p:pic>
+        <p:nvPicPr>
+          <p:cNvPr id="5" name="Picture 4">
+            <a:extLst>
+              <a:ext uri="{FF2B5EF4-FFF2-40B4-BE49-F238E27FC236}">
+                <a16:creationId xmlns:a16="http://schemas.microsoft.com/office/drawing/2014/main" id="{4C9328FE-B85C-B062-CC83-216F0F1B29D4}"/>
+              </a:ext>
+            </a:extLst>
+          </p:cNvPr>
+          <p:cNvPicPr>
+            <a:picLocks noChangeAspect="1"/>
+          </p:cNvPicPr>
+          <p:nvPr/>
+        </p:nvPicPr>
+        <p:blipFill>
+          <a:blip r:embed="rId2"/>
+          <a:stretch>
+            <a:fillRect/>
+          </a:stretch>
+        </p:blipFill>
+        <p:spPr>
+          <a:xfrm>
+            <a:off x="865888" y="1680150"/>
+            <a:ext cx="7783011" cy="1838582"/>
+          </a:xfrm>
+          <a:prstGeom prst="rect">
+            <a:avLst/>
+          </a:prstGeom>
+        </p:spPr>
+      </p:pic>
+      <p:pic>
+        <p:nvPicPr>
+          <p:cNvPr id="7" name="Picture 6">
+            <a:extLst>
+              <a:ext uri="{FF2B5EF4-FFF2-40B4-BE49-F238E27FC236}">
+                <a16:creationId xmlns:a16="http://schemas.microsoft.com/office/drawing/2014/main" id="{E11B22BA-87DA-BED4-8B04-7402A34CD7C8}"/>
+              </a:ext>
+            </a:extLst>
+          </p:cNvPr>
+          <p:cNvPicPr>
+            <a:picLocks noChangeAspect="1"/>
+          </p:cNvPicPr>
+          <p:nvPr/>
+        </p:nvPicPr>
+        <p:blipFill>
+          <a:blip r:embed="rId3"/>
+          <a:stretch>
+            <a:fillRect/>
+          </a:stretch>
+        </p:blipFill>
+        <p:spPr>
+          <a:xfrm>
+            <a:off x="1852134" y="3692311"/>
+            <a:ext cx="7563906" cy="2829320"/>
+          </a:xfrm>
+          <a:prstGeom prst="rect">
+            <a:avLst/>
+          </a:prstGeom>
+        </p:spPr>
+      </p:pic>
     </p:spTree>
     <p:extLst>
       <p:ext uri="{BB962C8B-B14F-4D97-AF65-F5344CB8AC3E}">
@@ -4380,6 +4505,36 @@
           </a:p>
         </p:txBody>
       </p:sp>
+      <p:pic>
+        <p:nvPicPr>
+          <p:cNvPr id="5" name="Picture 4">
+            <a:extLst>
+              <a:ext uri="{FF2B5EF4-FFF2-40B4-BE49-F238E27FC236}">
+                <a16:creationId xmlns:a16="http://schemas.microsoft.com/office/drawing/2014/main" id="{32AFB939-DBB3-A7EE-2537-50104649E41B}"/>
+              </a:ext>
+            </a:extLst>
+          </p:cNvPr>
+          <p:cNvPicPr>
+            <a:picLocks noChangeAspect="1"/>
+          </p:cNvPicPr>
+          <p:nvPr/>
+        </p:nvPicPr>
+        <p:blipFill>
+          <a:blip r:embed="rId2"/>
+          <a:stretch>
+            <a:fillRect/>
+          </a:stretch>
+        </p:blipFill>
+        <p:spPr>
+          <a:xfrm>
+            <a:off x="561202" y="956917"/>
+            <a:ext cx="11069595" cy="4944165"/>
+          </a:xfrm>
+          <a:prstGeom prst="rect">
+            <a:avLst/>
+          </a:prstGeom>
+        </p:spPr>
+      </p:pic>
     </p:spTree>
     <p:extLst>
       <p:ext uri="{BB962C8B-B14F-4D97-AF65-F5344CB8AC3E}">
@@ -4446,11 +4601,41 @@
           <a:p>
             <a:r>
               <a:rPr lang="en-IN" sz="2800" dirty="0"/>
-              <a:t>REPO AFTER PUSHING</a:t>
-            </a:r>
-          </a:p>
-        </p:txBody>
-      </p:sp>
+              <a:t>Pull request</a:t>
+            </a:r>
+          </a:p>
+        </p:txBody>
+      </p:sp>
+      <p:pic>
+        <p:nvPicPr>
+          <p:cNvPr id="5" name="Picture 4">
+            <a:extLst>
+              <a:ext uri="{FF2B5EF4-FFF2-40B4-BE49-F238E27FC236}">
+                <a16:creationId xmlns:a16="http://schemas.microsoft.com/office/drawing/2014/main" id="{B2E6CB6D-5D7C-364C-611F-3BD6890BCE3E}"/>
+              </a:ext>
+            </a:extLst>
+          </p:cNvPr>
+          <p:cNvPicPr>
+            <a:picLocks noChangeAspect="1"/>
+          </p:cNvPicPr>
+          <p:nvPr/>
+        </p:nvPicPr>
+        <p:blipFill>
+          <a:blip r:embed="rId2"/>
+          <a:stretch>
+            <a:fillRect/>
+          </a:stretch>
+        </p:blipFill>
+        <p:spPr>
+          <a:xfrm>
+            <a:off x="742852" y="1514054"/>
+            <a:ext cx="9790030" cy="4603157"/>
+          </a:xfrm>
+          <a:prstGeom prst="rect">
+            <a:avLst/>
+          </a:prstGeom>
+        </p:spPr>
+      </p:pic>
     </p:spTree>
     <p:extLst>
       <p:ext uri="{BB962C8B-B14F-4D97-AF65-F5344CB8AC3E}">

</xml_diff>